<commit_message>
add another case - CVE-2016-4470
</commit_message>
<xml_diff>
--- a/UAF/2016/CVE-2016-4470.pptx
+++ b/UAF/2016/CVE-2016-4470.pptx
@@ -8,8 +8,11 @@
     <p:sldId id="256" r:id="rId3"/>
     <p:sldId id="258" r:id="rId4"/>
     <p:sldId id="257" r:id="rId5"/>
-    <p:sldId id="259" r:id="rId6"/>
-    <p:sldId id="260" r:id="rId7"/>
+    <p:sldId id="263" r:id="rId6"/>
+    <p:sldId id="266" r:id="rId7"/>
+    <p:sldId id="259" r:id="rId8"/>
+    <p:sldId id="260" r:id="rId9"/>
+    <p:sldId id="262" r:id="rId10"/>
   </p:sldIdLst>
   <p:sldSz cx="12192000" cy="6858000"/>
   <p:notesSz cx="7103745" cy="10234295"/>
@@ -2646,10 +2649,10 @@
           <a:bodyPr/>
           <a:p>
             <a:r>
-              <a:rPr lang="" altLang="en-US"/>
-              <a:t>CVE ID</a:t>
-            </a:r>
-            <a:endParaRPr lang="" altLang="en-US"/>
+              <a:rPr lang="en-US" altLang="en-US"/>
+              <a:t>CVE-2016-4470</a:t>
+            </a:r>
+            <a:endParaRPr lang="en-US" altLang="en-US"/>
           </a:p>
         </p:txBody>
       </p:sp>
@@ -2704,10 +2707,10 @@
           <a:bodyPr/>
           <a:p>
             <a:r>
-              <a:rPr lang="" altLang="en-US"/>
+              <a:rPr lang="en-US" altLang="en-US"/>
               <a:t>Description</a:t>
             </a:r>
-            <a:endParaRPr lang="" altLang="en-US"/>
+            <a:endParaRPr lang="en-US" altLang="en-US"/>
           </a:p>
         </p:txBody>
       </p:sp>
@@ -2726,10 +2729,22 @@
           <a:bodyPr/>
           <a:p>
             <a:r>
-              <a:rPr lang="" altLang="en-US"/>
-              <a:t>feel free to extend if you think one page is not enough.</a:t>
-            </a:r>
-            <a:endParaRPr lang="" altLang="en-US"/>
+              <a:rPr lang="en-US" altLang="en-US"/>
+              <a:t>The key_reject_and_link function in security/keys/key.c in the Linux kernel </a:t>
+            </a:r>
+            <a:r>
+              <a:rPr lang="en-US" altLang="en-US">
+                <a:solidFill>
+                  <a:srgbClr val="FF0000"/>
+                </a:solidFill>
+              </a:rPr>
+              <a:t>through 4.6.3</a:t>
+            </a:r>
+            <a:r>
+              <a:rPr lang="en-US" altLang="en-US"/>
+              <a:t> does not ensure that a certain data structure is initialized, which allows local users to cause a denial of service (system crash) via vectors involving a crafted keyctl request2 command.</a:t>
+            </a:r>
+            <a:endParaRPr lang="en-US" altLang="en-US"/>
           </a:p>
         </p:txBody>
       </p:sp>
@@ -2766,34 +2781,267 @@
           <a:bodyPr/>
           <a:p>
             <a:r>
-              <a:rPr lang="" altLang="en-US"/>
+              <a:rPr lang="en-US" altLang="en-US"/>
               <a:t>Root Cause</a:t>
             </a:r>
-            <a:endParaRPr lang="" altLang="en-US"/>
-          </a:p>
-        </p:txBody>
-      </p:sp>
-      <p:sp>
-        <p:nvSpPr>
-          <p:cNvPr id="3" name="Content Placeholder 2"/>
-          <p:cNvSpPr>
-            <a:spLocks noGrp="1"/>
-          </p:cNvSpPr>
+            <a:endParaRPr lang="en-US" altLang="en-US"/>
+          </a:p>
+        </p:txBody>
+      </p:sp>
+      <p:pic>
+        <p:nvPicPr>
+          <p:cNvPr id="4" name="Content Placeholder 3" descr="Screenshot from 2019-01-05 16-30-33"/>
+          <p:cNvPicPr>
+            <a:picLocks noChangeAspect="1"/>
+          </p:cNvPicPr>
           <p:nvPr>
             <p:ph idx="1"/>
           </p:nvPr>
-        </p:nvSpPr>
-        <p:spPr/>
-        <p:txBody>
-          <a:bodyPr/>
+        </p:nvPicPr>
+        <p:blipFill>
+          <a:blip r:embed="rId1"/>
+          <a:stretch>
+            <a:fillRect/>
+          </a:stretch>
+        </p:blipFill>
+        <p:spPr>
+          <a:xfrm>
+            <a:off x="838200" y="1691005"/>
+            <a:ext cx="5743575" cy="3209925"/>
+          </a:xfrm>
+          <a:prstGeom prst="rect">
+            <a:avLst/>
+          </a:prstGeom>
+        </p:spPr>
+      </p:pic>
+      <p:sp>
+        <p:nvSpPr>
+          <p:cNvPr id="6" name="Text Box 5"/>
+          <p:cNvSpPr txBox="1"/>
+          <p:nvPr/>
+        </p:nvSpPr>
+        <p:spPr>
+          <a:xfrm>
+            <a:off x="6664325" y="2834640"/>
+            <a:ext cx="4794250" cy="922020"/>
+          </a:xfrm>
+          <a:prstGeom prst="rect">
+            <a:avLst/>
+          </a:prstGeom>
+          <a:noFill/>
+        </p:spPr>
+        <p:txBody>
+          <a:bodyPr wrap="square" rtlCol="0">
+            <a:spAutoFit/>
+          </a:bodyPr>
+          <a:p>
+            <a:r>
+              <a:rPr lang="" altLang="en-US">
+                <a:solidFill>
+                  <a:srgbClr val="FF0000"/>
+                </a:solidFill>
+              </a:rPr>
+              <a:t>If __key_link_begin fails, it will not allocate space for variable </a:t>
+            </a:r>
+            <a:r>
+              <a:rPr lang="" altLang="en-US" i="1">
+                <a:solidFill>
+                  <a:srgbClr val="FF0000"/>
+                </a:solidFill>
+              </a:rPr>
+              <a:t>edit</a:t>
+            </a:r>
+            <a:r>
+              <a:rPr lang="" altLang="en-US">
+                <a:solidFill>
+                  <a:srgbClr val="FF0000"/>
+                </a:solidFill>
+              </a:rPr>
+              <a:t>, which leaves </a:t>
+            </a:r>
+            <a:r>
+              <a:rPr lang="" altLang="en-US" i="1">
+                <a:solidFill>
+                  <a:srgbClr val="FF0000"/>
+                </a:solidFill>
+              </a:rPr>
+              <a:t>edit </a:t>
+            </a:r>
+            <a:r>
+              <a:rPr lang="" altLang="en-US">
+                <a:solidFill>
+                  <a:srgbClr val="FF0000"/>
+                </a:solidFill>
+              </a:rPr>
+              <a:t>as an uninitialized variable.</a:t>
+            </a:r>
+            <a:endParaRPr lang="" altLang="en-US">
+              <a:solidFill>
+                <a:srgbClr val="FF0000"/>
+              </a:solidFill>
+            </a:endParaRPr>
+          </a:p>
+        </p:txBody>
+      </p:sp>
+      <p:sp>
+        <p:nvSpPr>
+          <p:cNvPr id="7" name="Left Arrow 6"/>
+          <p:cNvSpPr/>
+          <p:nvPr/>
+        </p:nvSpPr>
+        <p:spPr>
+          <a:xfrm rot="19320000">
+            <a:off x="5817235" y="3784600"/>
+            <a:ext cx="772795" cy="239395"/>
+          </a:xfrm>
+          <a:prstGeom prst="leftArrow">
+            <a:avLst>
+              <a:gd name="adj1" fmla="val 50000"/>
+              <a:gd name="adj2" fmla="val 83142"/>
+            </a:avLst>
+          </a:prstGeom>
+          <a:gradFill>
+            <a:gsLst>
+              <a:gs pos="0">
+                <a:srgbClr val="FE4444"/>
+              </a:gs>
+              <a:gs pos="100000">
+                <a:srgbClr val="832B2B"/>
+              </a:gs>
+            </a:gsLst>
+            <a:lin ang="5400000" scaled="0"/>
+          </a:gradFill>
+          <a:ln>
+            <a:noFill/>
+          </a:ln>
+        </p:spPr>
+        <p:style>
+          <a:lnRef idx="2">
+            <a:schemeClr val="accent1">
+              <a:shade val="50000"/>
+            </a:schemeClr>
+          </a:lnRef>
+          <a:fillRef idx="1">
+            <a:schemeClr val="accent1"/>
+          </a:fillRef>
+          <a:effectRef idx="0">
+            <a:schemeClr val="accent1"/>
+          </a:effectRef>
+          <a:fontRef idx="minor">
+            <a:schemeClr val="lt1"/>
+          </a:fontRef>
+        </p:style>
+        <p:txBody>
+          <a:bodyPr rtlCol="0" anchor="ctr"/>
+          <a:p>
+            <a:pPr algn="ctr"/>
+            <a:endParaRPr lang="en-US"/>
+          </a:p>
+        </p:txBody>
+      </p:sp>
+      <p:sp>
+        <p:nvSpPr>
+          <p:cNvPr id="9" name="Text Box 8"/>
+          <p:cNvSpPr txBox="1"/>
+          <p:nvPr/>
+        </p:nvSpPr>
+        <p:spPr>
+          <a:xfrm>
+            <a:off x="2676525" y="6117590"/>
+            <a:ext cx="7339965" cy="368300"/>
+          </a:xfrm>
+          <a:prstGeom prst="rect">
+            <a:avLst/>
+          </a:prstGeom>
+          <a:noFill/>
+        </p:spPr>
+        <p:txBody>
+          <a:bodyPr wrap="square" rtlCol="0">
+            <a:spAutoFit/>
+          </a:bodyPr>
+          <a:p>
+            <a:r>
+              <a:rPr lang="en-US">
+                <a:solidFill>
+                  <a:srgbClr val="FF0000"/>
+                </a:solidFill>
+              </a:rPr>
+              <a:t>https://elixir.bootlin.com/linux/v4.6.3/source/security/keys/key.c#L538</a:t>
+            </a:r>
+            <a:endParaRPr lang="en-US">
+              <a:solidFill>
+                <a:srgbClr val="FF0000"/>
+              </a:solidFill>
+            </a:endParaRPr>
+          </a:p>
+        </p:txBody>
+      </p:sp>
+      <p:pic>
+        <p:nvPicPr>
+          <p:cNvPr id="10" name="Picture 9" descr="Screenshot from 2019-01-05 16-31-09"/>
+          <p:cNvPicPr>
+            <a:picLocks noChangeAspect="1"/>
+          </p:cNvPicPr>
+          <p:nvPr/>
+        </p:nvPicPr>
+        <p:blipFill>
+          <a:blip r:embed="rId2"/>
+          <a:stretch>
+            <a:fillRect/>
+          </a:stretch>
+        </p:blipFill>
+        <p:spPr>
+          <a:xfrm>
+            <a:off x="838200" y="5195570"/>
+            <a:ext cx="5219065" cy="704850"/>
+          </a:xfrm>
+          <a:prstGeom prst="rect">
+            <a:avLst/>
+          </a:prstGeom>
+        </p:spPr>
+      </p:pic>
+      <p:sp>
+        <p:nvSpPr>
+          <p:cNvPr id="11" name="Text Box 10"/>
+          <p:cNvSpPr txBox="1"/>
+          <p:nvPr/>
+        </p:nvSpPr>
+        <p:spPr>
+          <a:xfrm>
+            <a:off x="5904230" y="5022850"/>
+            <a:ext cx="5624830" cy="922020"/>
+          </a:xfrm>
+          <a:prstGeom prst="rect">
+            <a:avLst/>
+          </a:prstGeom>
+          <a:noFill/>
+        </p:spPr>
+        <p:txBody>
+          <a:bodyPr wrap="square" rtlCol="0">
+            <a:spAutoFit/>
+          </a:bodyPr>
           <a:p>
             <a:r>
               <a:rPr lang="en-US" altLang="en-US">
-                <a:sym typeface="+mn-ea"/>
+                <a:solidFill>
+                  <a:srgbClr val="FF0000"/>
+                </a:solidFill>
               </a:rPr>
-              <a:t>feel free to extend if you think one page is not enough.</a:t>
-            </a:r>
-            <a:endParaRPr lang="en-US"/>
+              <a:t>No matter whether __key_link_begin fails or not, __key_link_end will execute to free some space associated with variable </a:t>
+            </a:r>
+            <a:r>
+              <a:rPr lang="en-US" altLang="en-US" i="1">
+                <a:solidFill>
+                  <a:srgbClr val="FF0000"/>
+                </a:solidFill>
+              </a:rPr>
+              <a:t>edit.</a:t>
+            </a:r>
+            <a:endParaRPr lang="en-US" altLang="en-US" i="1">
+              <a:solidFill>
+                <a:srgbClr val="FF0000"/>
+              </a:solidFill>
+            </a:endParaRPr>
           </a:p>
         </p:txBody>
       </p:sp>
@@ -2827,36 +3075,111 @@
         </p:nvSpPr>
         <p:spPr/>
         <p:txBody>
-          <a:bodyPr/>
-          <a:p>
-            <a:r>
-              <a:rPr lang="" altLang="en-US"/>
-              <a:t>Patch</a:t>
-            </a:r>
-            <a:endParaRPr lang="" altLang="en-US"/>
-          </a:p>
-        </p:txBody>
-      </p:sp>
-      <p:sp>
-        <p:nvSpPr>
-          <p:cNvPr id="3" name="Content Placeholder 2"/>
-          <p:cNvSpPr>
-            <a:spLocks noGrp="1"/>
-          </p:cNvSpPr>
-          <p:nvPr>
-            <p:ph idx="1"/>
-          </p:nvPr>
-        </p:nvSpPr>
-        <p:spPr/>
-        <p:txBody>
-          <a:bodyPr/>
+          <a:bodyPr>
+            <a:normAutofit/>
+          </a:bodyPr>
           <a:p>
             <a:r>
               <a:rPr lang="en-US" altLang="en-US">
                 <a:sym typeface="+mn-ea"/>
               </a:rPr>
-              <a:t>feel free to extend if you think one page is not enough.</a:t>
-            </a:r>
+              <a:t>Root Cause</a:t>
+            </a:r>
+            <a:endParaRPr lang="en-US"/>
+          </a:p>
+        </p:txBody>
+      </p:sp>
+      <p:pic>
+        <p:nvPicPr>
+          <p:cNvPr id="4" name="Content Placeholder 3" descr="Screenshot from 2019-01-05 16-38-37"/>
+          <p:cNvPicPr>
+            <a:picLocks noChangeAspect="1"/>
+          </p:cNvPicPr>
+          <p:nvPr>
+            <p:ph idx="1"/>
+          </p:nvPr>
+        </p:nvPicPr>
+        <p:blipFill>
+          <a:blip r:embed="rId1"/>
+          <a:stretch>
+            <a:fillRect/>
+          </a:stretch>
+        </p:blipFill>
+        <p:spPr>
+          <a:xfrm>
+            <a:off x="838200" y="1929130"/>
+            <a:ext cx="5587365" cy="4351655"/>
+          </a:xfrm>
+          <a:prstGeom prst="rect">
+            <a:avLst/>
+          </a:prstGeom>
+        </p:spPr>
+      </p:pic>
+      <p:pic>
+        <p:nvPicPr>
+          <p:cNvPr id="5" name="Picture 4" descr="Screenshot from 2019-01-05 16-39-08"/>
+          <p:cNvPicPr>
+            <a:picLocks noChangeAspect="1"/>
+          </p:cNvPicPr>
+          <p:nvPr/>
+        </p:nvPicPr>
+        <p:blipFill>
+          <a:blip r:embed="rId2"/>
+          <a:stretch>
+            <a:fillRect/>
+          </a:stretch>
+        </p:blipFill>
+        <p:spPr>
+          <a:xfrm>
+            <a:off x="6518275" y="1157605"/>
+            <a:ext cx="5535930" cy="5192395"/>
+          </a:xfrm>
+          <a:prstGeom prst="rect">
+            <a:avLst/>
+          </a:prstGeom>
+        </p:spPr>
+      </p:pic>
+      <p:sp>
+        <p:nvSpPr>
+          <p:cNvPr id="6" name="Rectangle 5"/>
+          <p:cNvSpPr/>
+          <p:nvPr/>
+        </p:nvSpPr>
+        <p:spPr>
+          <a:xfrm>
+            <a:off x="1836420" y="4341495"/>
+            <a:ext cx="3241675" cy="1249045"/>
+          </a:xfrm>
+          <a:prstGeom prst="rect">
+            <a:avLst/>
+          </a:prstGeom>
+          <a:noFill/>
+          <a:ln w="25400">
+            <a:solidFill>
+              <a:srgbClr val="FF0000"/>
+            </a:solidFill>
+          </a:ln>
+        </p:spPr>
+        <p:style>
+          <a:lnRef idx="2">
+            <a:schemeClr val="accent1">
+              <a:shade val="50000"/>
+            </a:schemeClr>
+          </a:lnRef>
+          <a:fillRef idx="1">
+            <a:schemeClr val="accent1"/>
+          </a:fillRef>
+          <a:effectRef idx="0">
+            <a:schemeClr val="accent1"/>
+          </a:effectRef>
+          <a:fontRef idx="minor">
+            <a:schemeClr val="lt1"/>
+          </a:fontRef>
+        </p:style>
+        <p:txBody>
+          <a:bodyPr rtlCol="0" anchor="ctr"/>
+          <a:p>
+            <a:pPr algn="ctr"/>
             <a:endParaRPr lang="en-US"/>
           </a:p>
         </p:txBody>
@@ -2895,9 +3218,314 @@
           <a:p>
             <a:r>
               <a:rPr lang="" altLang="en-US"/>
+              <a:t>Root Cause</a:t>
+            </a:r>
+            <a:endParaRPr lang="" altLang="en-US"/>
+          </a:p>
+        </p:txBody>
+      </p:sp>
+      <p:pic>
+        <p:nvPicPr>
+          <p:cNvPr id="4" name="Content Placeholder 3" descr="Screenshot from 2019-01-05 17-03-43"/>
+          <p:cNvPicPr>
+            <a:picLocks noChangeAspect="1"/>
+          </p:cNvPicPr>
+          <p:nvPr>
+            <p:ph idx="1"/>
+          </p:nvPr>
+        </p:nvPicPr>
+        <p:blipFill>
+          <a:blip r:embed="rId1"/>
+          <a:stretch>
+            <a:fillRect/>
+          </a:stretch>
+        </p:blipFill>
+        <p:spPr>
+          <a:xfrm>
+            <a:off x="300990" y="2058670"/>
+            <a:ext cx="5772150" cy="3409950"/>
+          </a:xfrm>
+          <a:prstGeom prst="rect">
+            <a:avLst/>
+          </a:prstGeom>
+        </p:spPr>
+      </p:pic>
+      <p:pic>
+        <p:nvPicPr>
+          <p:cNvPr id="5" name="Picture 4" descr="Screenshot from 2019-01-05 17-04-12"/>
+          <p:cNvPicPr>
+            <a:picLocks noChangeAspect="1"/>
+          </p:cNvPicPr>
+          <p:nvPr/>
+        </p:nvPicPr>
+        <p:blipFill>
+          <a:blip r:embed="rId2"/>
+          <a:stretch>
+            <a:fillRect/>
+          </a:stretch>
+        </p:blipFill>
+        <p:spPr>
+          <a:xfrm>
+            <a:off x="6228080" y="2216150"/>
+            <a:ext cx="5723890" cy="3094990"/>
+          </a:xfrm>
+          <a:prstGeom prst="rect">
+            <a:avLst/>
+          </a:prstGeom>
+        </p:spPr>
+      </p:pic>
+      <p:sp>
+        <p:nvSpPr>
+          <p:cNvPr id="6" name="Rectangle 5"/>
+          <p:cNvSpPr/>
+          <p:nvPr/>
+        </p:nvSpPr>
+        <p:spPr>
+          <a:xfrm>
+            <a:off x="8329930" y="4011930"/>
+            <a:ext cx="3417570" cy="681355"/>
+          </a:xfrm>
+          <a:prstGeom prst="rect">
+            <a:avLst/>
+          </a:prstGeom>
+          <a:noFill/>
+          <a:ln w="28575">
+            <a:solidFill>
+              <a:srgbClr val="FF0000"/>
+            </a:solidFill>
+          </a:ln>
+        </p:spPr>
+        <p:style>
+          <a:lnRef idx="2">
+            <a:schemeClr val="accent1">
+              <a:shade val="50000"/>
+            </a:schemeClr>
+          </a:lnRef>
+          <a:fillRef idx="1">
+            <a:schemeClr val="accent1"/>
+          </a:fillRef>
+          <a:effectRef idx="0">
+            <a:schemeClr val="accent1"/>
+          </a:effectRef>
+          <a:fontRef idx="minor">
+            <a:schemeClr val="lt1"/>
+          </a:fontRef>
+        </p:style>
+        <p:txBody>
+          <a:bodyPr rtlCol="0" anchor="ctr"/>
+          <a:p>
+            <a:pPr algn="ctr"/>
+            <a:endParaRPr lang="en-US"/>
+          </a:p>
+        </p:txBody>
+      </p:sp>
+      <p:sp>
+        <p:nvSpPr>
+          <p:cNvPr id="7" name="Rectangle 6"/>
+          <p:cNvSpPr/>
+          <p:nvPr/>
+        </p:nvSpPr>
+        <p:spPr>
+          <a:xfrm>
+            <a:off x="7268845" y="4973320"/>
+            <a:ext cx="1061720" cy="175895"/>
+          </a:xfrm>
+          <a:prstGeom prst="rect">
+            <a:avLst/>
+          </a:prstGeom>
+          <a:noFill/>
+          <a:ln w="25400">
+            <a:solidFill>
+              <a:srgbClr val="FF0000"/>
+            </a:solidFill>
+          </a:ln>
+        </p:spPr>
+        <p:style>
+          <a:lnRef idx="2">
+            <a:schemeClr val="accent1">
+              <a:shade val="50000"/>
+            </a:schemeClr>
+          </a:lnRef>
+          <a:fillRef idx="1">
+            <a:schemeClr val="accent1"/>
+          </a:fillRef>
+          <a:effectRef idx="0">
+            <a:schemeClr val="accent1"/>
+          </a:effectRef>
+          <a:fontRef idx="minor">
+            <a:schemeClr val="lt1"/>
+          </a:fontRef>
+        </p:style>
+        <p:txBody>
+          <a:bodyPr rtlCol="0" anchor="ctr"/>
+          <a:p>
+            <a:pPr algn="ctr"/>
+            <a:endParaRPr lang="en-US"/>
+          </a:p>
+        </p:txBody>
+      </p:sp>
+    </p:spTree>
+  </p:cSld>
+  <p:clrMapOvr>
+    <a:masterClrMapping/>
+  </p:clrMapOvr>
+</p:sld>
+</file>
+
+<file path=ppt/slides/slide6.xml><?xml version="1.0" encoding="utf-8"?>
+<p:sld xmlns:a="http://schemas.openxmlformats.org/drawingml/2006/main" xmlns:r="http://schemas.openxmlformats.org/officeDocument/2006/relationships" xmlns:p="http://schemas.openxmlformats.org/presentationml/2006/main">
+  <p:cSld>
+    <p:spTree>
+      <p:nvGrpSpPr>
+        <p:cNvPr id="1" name=""/>
+        <p:cNvGrpSpPr/>
+        <p:nvPr/>
+      </p:nvGrpSpPr>
+      <p:grpSpPr/>
+      <p:sp>
+        <p:nvSpPr>
+          <p:cNvPr id="2" name="Title 1"/>
+          <p:cNvSpPr>
+            <a:spLocks noGrp="1"/>
+          </p:cNvSpPr>
+          <p:nvPr>
+            <p:ph type="title"/>
+          </p:nvPr>
+        </p:nvSpPr>
+        <p:spPr/>
+        <p:txBody>
+          <a:bodyPr/>
+          <a:p>
+            <a:r>
+              <a:rPr lang="en-US" altLang="en-US"/>
+              <a:t>Patch</a:t>
+            </a:r>
+            <a:endParaRPr lang="en-US" altLang="en-US"/>
+          </a:p>
+        </p:txBody>
+      </p:sp>
+      <p:pic>
+        <p:nvPicPr>
+          <p:cNvPr id="5" name="Picture 4" descr="Screenshot from 2019-01-05 17-09-09"/>
+          <p:cNvPicPr>
+            <a:picLocks noChangeAspect="1"/>
+          </p:cNvPicPr>
+          <p:nvPr/>
+        </p:nvPicPr>
+        <p:blipFill>
+          <a:blip r:embed="rId1"/>
+          <a:stretch>
+            <a:fillRect/>
+          </a:stretch>
+        </p:blipFill>
+        <p:spPr>
+          <a:xfrm>
+            <a:off x="838200" y="2781300"/>
+            <a:ext cx="5019040" cy="1295400"/>
+          </a:xfrm>
+          <a:prstGeom prst="rect">
+            <a:avLst/>
+          </a:prstGeom>
+        </p:spPr>
+      </p:pic>
+      <p:pic>
+        <p:nvPicPr>
+          <p:cNvPr id="7" name="Picture 6" descr="Screenshot from 2019-01-05 17-09-26"/>
+          <p:cNvPicPr>
+            <a:picLocks noChangeAspect="1"/>
+          </p:cNvPicPr>
+          <p:nvPr/>
+        </p:nvPicPr>
+        <p:blipFill>
+          <a:blip r:embed="rId2"/>
+          <a:stretch>
+            <a:fillRect/>
+          </a:stretch>
+        </p:blipFill>
+        <p:spPr>
+          <a:xfrm>
+            <a:off x="6050915" y="2781300"/>
+            <a:ext cx="5190490" cy="1343025"/>
+          </a:xfrm>
+          <a:prstGeom prst="rect">
+            <a:avLst/>
+          </a:prstGeom>
+        </p:spPr>
+      </p:pic>
+      <p:sp>
+        <p:nvSpPr>
+          <p:cNvPr id="8" name="Text Box 7"/>
+          <p:cNvSpPr txBox="1"/>
+          <p:nvPr/>
+        </p:nvSpPr>
+        <p:spPr>
+          <a:xfrm>
+            <a:off x="1435100" y="5560060"/>
+            <a:ext cx="9322435" cy="368300"/>
+          </a:xfrm>
+          <a:prstGeom prst="rect">
+            <a:avLst/>
+          </a:prstGeom>
+          <a:noFill/>
+        </p:spPr>
+        <p:txBody>
+          <a:bodyPr wrap="square" rtlCol="0">
+            <a:spAutoFit/>
+          </a:bodyPr>
+          <a:p>
+            <a:r>
+              <a:rPr lang="en-US">
+                <a:solidFill>
+                  <a:srgbClr val="FF0000"/>
+                </a:solidFill>
+              </a:rPr>
+              <a:t>https://github.com/torvalds/linux/commit/38327424b40bcebe2de92d07312c89360ac9229a</a:t>
+            </a:r>
+            <a:endParaRPr lang="en-US">
+              <a:solidFill>
+                <a:srgbClr val="FF0000"/>
+              </a:solidFill>
+            </a:endParaRPr>
+          </a:p>
+        </p:txBody>
+      </p:sp>
+    </p:spTree>
+  </p:cSld>
+  <p:clrMapOvr>
+    <a:masterClrMapping/>
+  </p:clrMapOvr>
+</p:sld>
+</file>
+
+<file path=ppt/slides/slide7.xml><?xml version="1.0" encoding="utf-8"?>
+<p:sld xmlns:a="http://schemas.openxmlformats.org/drawingml/2006/main" xmlns:r="http://schemas.openxmlformats.org/officeDocument/2006/relationships" xmlns:p="http://schemas.openxmlformats.org/presentationml/2006/main">
+  <p:cSld>
+    <p:spTree>
+      <p:nvGrpSpPr>
+        <p:cNvPr id="1" name=""/>
+        <p:cNvGrpSpPr/>
+        <p:nvPr/>
+      </p:nvGrpSpPr>
+      <p:grpSpPr/>
+      <p:sp>
+        <p:nvSpPr>
+          <p:cNvPr id="2" name="Title 1"/>
+          <p:cNvSpPr>
+            <a:spLocks noGrp="1"/>
+          </p:cNvSpPr>
+          <p:nvPr>
+            <p:ph type="title"/>
+          </p:nvPr>
+        </p:nvSpPr>
+        <p:spPr/>
+        <p:txBody>
+          <a:bodyPr/>
+          <a:p>
+            <a:r>
+              <a:rPr lang="en-US" altLang="en-US"/>
               <a:t>Patch Analysis</a:t>
             </a:r>
-            <a:endParaRPr lang="" altLang="en-US"/>
+            <a:endParaRPr lang="en-US" altLang="en-US"/>
           </a:p>
         </p:txBody>
       </p:sp>
@@ -2919,7 +3547,99 @@
               <a:rPr lang="en-US" altLang="en-US">
                 <a:sym typeface="+mn-ea"/>
               </a:rPr>
-              <a:t>feel free to extend if you think one page is not enough.</a:t>
+              <a:t>Add (link_ret == 0) to verify whether the preallocation of variable </a:t>
+            </a:r>
+            <a:r>
+              <a:rPr lang="en-US" altLang="en-US" i="1">
+                <a:sym typeface="+mn-ea"/>
+              </a:rPr>
+              <a:t>edit is done</a:t>
+            </a:r>
+            <a:endParaRPr lang="en-US"/>
+          </a:p>
+        </p:txBody>
+      </p:sp>
+    </p:spTree>
+  </p:cSld>
+  <p:clrMapOvr>
+    <a:masterClrMapping/>
+  </p:clrMapOvr>
+</p:sld>
+</file>
+
+<file path=ppt/slides/slide8.xml><?xml version="1.0" encoding="utf-8"?>
+<p:sld xmlns:a="http://schemas.openxmlformats.org/drawingml/2006/main" xmlns:r="http://schemas.openxmlformats.org/officeDocument/2006/relationships" xmlns:p="http://schemas.openxmlformats.org/presentationml/2006/main">
+  <p:cSld>
+    <p:spTree>
+      <p:nvGrpSpPr>
+        <p:cNvPr id="1" name=""/>
+        <p:cNvGrpSpPr/>
+        <p:nvPr/>
+      </p:nvGrpSpPr>
+      <p:grpSpPr/>
+      <p:sp>
+        <p:nvSpPr>
+          <p:cNvPr id="2" name="Title 1"/>
+          <p:cNvSpPr>
+            <a:spLocks noGrp="1"/>
+          </p:cNvSpPr>
+          <p:nvPr>
+            <p:ph type="title"/>
+          </p:nvPr>
+        </p:nvSpPr>
+        <p:spPr/>
+        <p:txBody>
+          <a:bodyPr/>
+          <a:p>
+            <a:r>
+              <a:rPr lang="en-US" altLang="en-US"/>
+              <a:t>References</a:t>
+            </a:r>
+            <a:endParaRPr lang="en-US" altLang="en-US"/>
+          </a:p>
+        </p:txBody>
+      </p:sp>
+      <p:sp>
+        <p:nvSpPr>
+          <p:cNvPr id="3" name="Content Placeholder 2"/>
+          <p:cNvSpPr>
+            <a:spLocks noGrp="1"/>
+          </p:cNvSpPr>
+          <p:nvPr>
+            <p:ph idx="1"/>
+          </p:nvPr>
+        </p:nvSpPr>
+        <p:spPr/>
+        <p:txBody>
+          <a:bodyPr/>
+          <a:p>
+            <a:r>
+              <a:rPr lang="en-US">
+                <a:hlinkClick r:id="rId1" action="ppaction://hlinkfile"/>
+              </a:rPr>
+              <a:t>https://nvd.nist.gov/vuln/detail/CVE-2016-4470</a:t>
+            </a:r>
+            <a:endParaRPr lang="en-US">
+              <a:hlinkClick r:id="rId1" action="ppaction://hlinkfile"/>
+            </a:endParaRPr>
+          </a:p>
+          <a:p>
+            <a:r>
+              <a:rPr lang="en-US">
+                <a:hlinkClick r:id="rId2" tooltip="" action="ppaction://hlinkfile"/>
+              </a:rPr>
+              <a:t>https://git.kernel.org/pub/scm/linux/kernel/git/torvalds/linux.git/commit/?id=38327424b40bcebe2de92d07312c89360ac9229a</a:t>
+            </a:r>
+            <a:endParaRPr lang="en-US">
+              <a:hlinkClick r:id="rId2" tooltip="" action="ppaction://hlinkfile"/>
+            </a:endParaRPr>
+          </a:p>
+          <a:p>
+            <a:r>
+              <a:rPr lang="en-US">
+                <a:hlinkClick r:id="rId3" tooltip="" action="ppaction://hlinkfile"/>
+              </a:rPr>
+              <a:t>https://www.openwall.com/lists/oss-security/2016/06/15/11</a:t>
             </a:r>
             <a:endParaRPr lang="en-US"/>
           </a:p>

</xml_diff>